<commit_message>
afwerken van de powerpoint
</commit_message>
<xml_diff>
--- a/nieuwe technologie/slidedeck/sapui5.pptx
+++ b/nieuwe technologie/slidedeck/sapui5.pptx
@@ -13,8 +13,8 @@
     <p:sldId id="261" r:id="rId7"/>
     <p:sldId id="262" r:id="rId8"/>
     <p:sldId id="263" r:id="rId9"/>
-    <p:sldId id="264" r:id="rId10"/>
-    <p:sldId id="265" r:id="rId11"/>
+    <p:sldId id="265" r:id="rId10"/>
+    <p:sldId id="264" r:id="rId11"/>
     <p:sldId id="266" r:id="rId12"/>
     <p:sldId id="267" r:id="rId13"/>
     <p:sldId id="268" r:id="rId14"/>
@@ -29,6 +29,11 @@
     <p:sldId id="273" r:id="rId23"/>
     <p:sldId id="274" r:id="rId24"/>
     <p:sldId id="275" r:id="rId25"/>
+    <p:sldId id="280" r:id="rId26"/>
+    <p:sldId id="282" r:id="rId27"/>
+    <p:sldId id="283" r:id="rId28"/>
+    <p:sldId id="284" r:id="rId29"/>
+    <p:sldId id="285" r:id="rId30"/>
   </p:sldIdLst>
   <p:sldSz cx="12192000" cy="6858000"/>
   <p:notesSz cx="6858000" cy="9144000"/>
@@ -6273,7 +6278,7 @@
         </p:nvSpPr>
         <p:spPr>
           <a:xfrm>
-            <a:off x="1670921" y="-69979"/>
+            <a:off x="1652262" y="107303"/>
             <a:ext cx="10018713" cy="1752599"/>
           </a:xfrm>
         </p:spPr>
@@ -6283,122 +6288,58 @@
           <a:p>
             <a:r>
               <a:rPr lang="nl-BE" dirty="0"/>
-              <a:t>5 principes</a:t>
-            </a:r>
-          </a:p>
-        </p:txBody>
-      </p:sp>
-      <p:sp>
-        <p:nvSpPr>
-          <p:cNvPr id="3" name="Tijdelijke aanduiding voor inhoud 2">
+              <a:t>SAP </a:t>
+            </a:r>
+            <a:r>
+              <a:rPr lang="nl-BE" dirty="0" err="1"/>
+              <a:t>Fiori</a:t>
+            </a:r>
+            <a:r>
+              <a:rPr lang="nl-BE" dirty="0"/>
+              <a:t> baseert zich op 5 principes: </a:t>
+            </a:r>
+          </a:p>
+        </p:txBody>
+      </p:sp>
+      <p:pic>
+        <p:nvPicPr>
+          <p:cNvPr id="5" name="Tijdelijke aanduiding voor inhoud 4">
             <a:extLst>
               <a:ext uri="{FF2B5EF4-FFF2-40B4-BE49-F238E27FC236}">
-                <a16:creationId xmlns:a16="http://schemas.microsoft.com/office/drawing/2014/main" id="{2E96BF2C-E254-4245-BC3A-FC630ED7780D}"/>
+                <a16:creationId xmlns:a16="http://schemas.microsoft.com/office/drawing/2014/main" id="{61AE6B38-B02E-4A62-B2B2-77F49F58C11B}"/>
               </a:ext>
             </a:extLst>
           </p:cNvPr>
-          <p:cNvSpPr>
-            <a:spLocks noGrp="1"/>
-          </p:cNvSpPr>
+          <p:cNvPicPr>
+            <a:picLocks noGrp="1" noChangeAspect="1"/>
+          </p:cNvPicPr>
           <p:nvPr>
             <p:ph idx="1"/>
           </p:nvPr>
-        </p:nvSpPr>
+        </p:nvPicPr>
+        <p:blipFill>
+          <a:blip r:embed="rId2">
+            <a:extLst>
+              <a:ext uri="{28A0092B-C50C-407E-A947-70E740481C1C}">
+                <a14:useLocalDpi xmlns:a14="http://schemas.microsoft.com/office/drawing/2010/main" val="0"/>
+              </a:ext>
+            </a:extLst>
+          </a:blip>
+          <a:stretch>
+            <a:fillRect/>
+          </a:stretch>
+        </p:blipFill>
         <p:spPr>
           <a:xfrm>
-            <a:off x="1670921" y="1682620"/>
-            <a:ext cx="10018713" cy="4587551"/>
+            <a:off x="3453656" y="1651519"/>
+            <a:ext cx="7086082" cy="4988767"/>
           </a:xfrm>
         </p:spPr>
-        <p:txBody>
-          <a:bodyPr>
-            <a:normAutofit/>
-          </a:bodyPr>
-          <a:lstStyle/>
-          <a:p>
-            <a:pPr lvl="0"/>
-            <a:r>
-              <a:rPr lang="nl-BE" dirty="0"/>
-              <a:t>Simpel:   de applicatie moet gemaakt worden voor: 1 user , 1 </a:t>
-            </a:r>
-            <a:r>
-              <a:rPr lang="nl-BE" dirty="0" err="1"/>
-              <a:t>use</a:t>
-            </a:r>
-            <a:r>
-              <a:rPr lang="nl-BE" dirty="0"/>
-              <a:t> case en 3 navigatie schermen</a:t>
-            </a:r>
-          </a:p>
-          <a:p>
-            <a:pPr lvl="0"/>
-            <a:r>
-              <a:rPr lang="nl-BE" dirty="0" err="1"/>
-              <a:t>Role</a:t>
-            </a:r>
-            <a:r>
-              <a:rPr lang="nl-BE" dirty="0"/>
-              <a:t> </a:t>
-            </a:r>
-            <a:r>
-              <a:rPr lang="nl-BE" dirty="0" err="1"/>
-              <a:t>based</a:t>
-            </a:r>
-            <a:r>
-              <a:rPr lang="nl-BE" dirty="0"/>
-              <a:t>: dezelfde applicatie moet kunnen worden gebruikt door verschillende gebruikers op verschillende niveaus tegelijkertijd</a:t>
-            </a:r>
-          </a:p>
-          <a:p>
-            <a:pPr lvl="0"/>
-            <a:r>
-              <a:rPr lang="nl-BE" dirty="0"/>
-              <a:t>Instant </a:t>
-            </a:r>
-            <a:r>
-              <a:rPr lang="nl-BE" dirty="0" err="1"/>
-              <a:t>value</a:t>
-            </a:r>
-            <a:r>
-              <a:rPr lang="nl-BE" dirty="0"/>
-              <a:t>: als je nieuw product maakt moet  het  een kleine stap zijn voor je eindgebruikers om zich aan te passen</a:t>
-            </a:r>
-          </a:p>
-          <a:p>
-            <a:pPr lvl="0"/>
-            <a:r>
-              <a:rPr lang="nl-BE" dirty="0"/>
-              <a:t>Coherent: de applicatie moet de zelfde look </a:t>
-            </a:r>
-            <a:r>
-              <a:rPr lang="nl-BE" dirty="0" err="1"/>
-              <a:t>and</a:t>
-            </a:r>
-            <a:r>
-              <a:rPr lang="nl-BE" dirty="0"/>
-              <a:t> feel hebben</a:t>
-            </a:r>
-          </a:p>
-          <a:p>
-            <a:pPr lvl="0"/>
-            <a:r>
-              <a:rPr lang="nl-BE" dirty="0" err="1"/>
-              <a:t>Responsive</a:t>
-            </a:r>
-            <a:r>
-              <a:rPr lang="nl-BE" dirty="0"/>
-              <a:t>:  beschikbaar op smartphone, tablet en desktop</a:t>
-            </a:r>
-          </a:p>
-          <a:p>
-            <a:endParaRPr lang="nl-BE" dirty="0"/>
-          </a:p>
-        </p:txBody>
-      </p:sp>
+      </p:pic>
     </p:spTree>
     <p:extLst>
       <p:ext uri="{BB962C8B-B14F-4D97-AF65-F5344CB8AC3E}">
-        <p14:creationId xmlns:p14="http://schemas.microsoft.com/office/powerpoint/2010/main" val="786528800"/>
+        <p14:creationId xmlns:p14="http://schemas.microsoft.com/office/powerpoint/2010/main" val="981682686"/>
       </p:ext>
     </p:extLst>
   </p:cSld>
@@ -6474,7 +6415,12 @@
             <p:ph idx="1"/>
           </p:nvPr>
         </p:nvSpPr>
-        <p:spPr/>
+        <p:spPr>
+          <a:xfrm>
+            <a:off x="1611310" y="1765299"/>
+            <a:ext cx="10018713" cy="3124201"/>
+          </a:xfrm>
+        </p:spPr>
         <p:txBody>
           <a:bodyPr/>
           <a:lstStyle/>
@@ -7846,7 +7792,12 @@
             <p:ph type="title"/>
           </p:nvPr>
         </p:nvSpPr>
-        <p:spPr/>
+        <p:spPr>
+          <a:xfrm>
+            <a:off x="1484310" y="190500"/>
+            <a:ext cx="10018713" cy="1752599"/>
+          </a:xfrm>
+        </p:spPr>
         <p:txBody>
           <a:bodyPr/>
           <a:lstStyle/>
@@ -7874,9 +7825,16 @@
             <p:ph idx="1"/>
           </p:nvPr>
         </p:nvSpPr>
-        <p:spPr/>
-        <p:txBody>
-          <a:bodyPr/>
+        <p:spPr>
+          <a:xfrm>
+            <a:off x="1484310" y="2340528"/>
+            <a:ext cx="10018713" cy="3450672"/>
+          </a:xfrm>
+        </p:spPr>
+        <p:txBody>
+          <a:bodyPr>
+            <a:normAutofit fontScale="92500" lnSpcReduction="10000"/>
+          </a:bodyPr>
           <a:lstStyle/>
           <a:p>
             <a:pPr>
@@ -7884,14 +7842,14 @@
               <a:buChar char="-"/>
             </a:pPr>
             <a:r>
-              <a:rPr lang="nl-BE" dirty="0"/>
+              <a:rPr lang="nl-BE" sz="3000" dirty="0"/>
               <a:t>Wat is SAP UI5 en SAP </a:t>
             </a:r>
             <a:r>
-              <a:rPr lang="nl-BE" dirty="0" err="1"/>
+              <a:rPr lang="nl-BE" sz="3000" dirty="0" err="1"/>
               <a:t>Fiori</a:t>
             </a:r>
-            <a:endParaRPr lang="nl-BE" dirty="0"/>
+            <a:endParaRPr lang="nl-BE" sz="3000" dirty="0"/>
           </a:p>
           <a:p>
             <a:pPr>
@@ -7899,15 +7857,15 @@
               <a:buChar char="-"/>
             </a:pPr>
             <a:r>
-              <a:rPr lang="nl-BE" dirty="0"/>
+              <a:rPr lang="nl-BE" sz="3000" dirty="0"/>
               <a:t>Installatie  </a:t>
             </a:r>
             <a:r>
-              <a:rPr lang="nl-BE" dirty="0" err="1"/>
+              <a:rPr lang="nl-BE" sz="3000" dirty="0" err="1"/>
               <a:t>Eclipse</a:t>
             </a:r>
             <a:r>
-              <a:rPr lang="nl-BE" dirty="0"/>
+              <a:rPr lang="nl-BE" sz="3000" dirty="0"/>
               <a:t> + UI5 componenten </a:t>
             </a:r>
           </a:p>
@@ -7917,18 +7875,26 @@
               <a:buChar char="-"/>
             </a:pPr>
             <a:r>
-              <a:rPr lang="nl-BE" dirty="0" err="1"/>
+              <a:rPr lang="nl-BE" sz="3000" dirty="0" err="1"/>
               <a:t>Hello</a:t>
             </a:r>
             <a:r>
-              <a:rPr lang="nl-BE" dirty="0"/>
+              <a:rPr lang="nl-BE" sz="3000" dirty="0"/>
               <a:t> </a:t>
             </a:r>
             <a:r>
-              <a:rPr lang="nl-BE" dirty="0" err="1"/>
+              <a:rPr lang="nl-BE" sz="3000" dirty="0" err="1"/>
               <a:t>world</a:t>
             </a:r>
-            <a:endParaRPr lang="nl-BE" dirty="0"/>
+            <a:r>
+              <a:rPr lang="nl-BE" sz="3000" dirty="0"/>
+              <a:t> </a:t>
+            </a:r>
+            <a:r>
+              <a:rPr lang="nl-BE" sz="3000" dirty="0" err="1"/>
+              <a:t>example</a:t>
+            </a:r>
+            <a:endParaRPr lang="nl-BE" sz="3000" dirty="0"/>
           </a:p>
           <a:p>
             <a:pPr>
@@ -7936,9 +7902,55 @@
               <a:buChar char="-"/>
             </a:pPr>
             <a:r>
-              <a:rPr lang="nl-BE" dirty="0"/>
-              <a:t>MVC + second app</a:t>
-            </a:r>
+              <a:rPr lang="nl-BE" sz="3000" dirty="0"/>
+              <a:t>Werking  + 2 code </a:t>
+            </a:r>
+            <a:r>
+              <a:rPr lang="nl-BE" sz="3000" dirty="0" err="1"/>
+              <a:t>example</a:t>
+            </a:r>
+            <a:endParaRPr lang="nl-BE" sz="3000" dirty="0"/>
+          </a:p>
+          <a:p>
+            <a:pPr>
+              <a:buFontTx/>
+              <a:buChar char="-"/>
+            </a:pPr>
+            <a:r>
+              <a:rPr lang="nl-BE" sz="3000" dirty="0"/>
+              <a:t>Eventhandling + </a:t>
+            </a:r>
+            <a:r>
+              <a:rPr lang="nl-BE" sz="3000" dirty="0" err="1"/>
+              <a:t>example</a:t>
+            </a:r>
+            <a:endParaRPr lang="nl-BE" sz="3000" dirty="0"/>
+          </a:p>
+          <a:p>
+            <a:pPr>
+              <a:buFontTx/>
+              <a:buChar char="-"/>
+            </a:pPr>
+            <a:r>
+              <a:rPr lang="nl-BE" sz="3000" dirty="0" err="1"/>
+              <a:t>oData</a:t>
+            </a:r>
+            <a:r>
+              <a:rPr lang="nl-BE" sz="3000" dirty="0"/>
+              <a:t> en GET + </a:t>
+            </a:r>
+            <a:r>
+              <a:rPr lang="nl-BE" sz="3000" dirty="0" err="1"/>
+              <a:t>example</a:t>
+            </a:r>
+            <a:endParaRPr lang="nl-BE" sz="3000" dirty="0"/>
+          </a:p>
+          <a:p>
+            <a:pPr>
+              <a:buFontTx/>
+              <a:buChar char="-"/>
+            </a:pPr>
+            <a:endParaRPr lang="nl-BE" sz="3000" dirty="0"/>
           </a:p>
           <a:p>
             <a:pPr marL="0" indent="0">
@@ -8195,7 +8207,16 @@
             </a:r>
             <a:r>
               <a:rPr lang="nl-BE" dirty="0"/>
-              <a:t> dus we schrijve dit op deze manier, de o die we ervoor schrijven komt van object</a:t>
+              <a:t> dus we schrijve dit op deze manier,</a:t>
+            </a:r>
+          </a:p>
+          <a:p>
+            <a:pPr marL="0" indent="0">
+              <a:buNone/>
+            </a:pPr>
+            <a:r>
+              <a:rPr lang="nl-BE" dirty="0"/>
+              <a:t>      de o die we ervoor schrijven komt van object</a:t>
             </a:r>
           </a:p>
           <a:p>
@@ -8387,7 +8408,7 @@
           <a:p>
             <a:r>
               <a:rPr lang="nl-BE" dirty="0"/>
-              <a:t>MVC en uitbreiding van </a:t>
+              <a:t>MVC, functies en uitbreiding van </a:t>
             </a:r>
             <a:r>
               <a:rPr lang="nl-BE" dirty="0" err="1"/>
@@ -8418,7 +8439,7 @@
         </p:nvSpPr>
         <p:spPr>
           <a:xfrm>
-            <a:off x="2356765" y="1295401"/>
+            <a:off x="2173287" y="2750977"/>
             <a:ext cx="10018713" cy="3124201"/>
           </a:xfrm>
         </p:spPr>
@@ -8445,7 +8466,33 @@
             </a:pPr>
             <a:r>
               <a:rPr lang="nl-BE" dirty="0"/>
-              <a:t>     en maken een volgend scherm</a:t>
+              <a:t>     en maken een volgend scherm.</a:t>
+            </a:r>
+          </a:p>
+          <a:p>
+            <a:pPr marL="0" indent="0">
+              <a:buNone/>
+            </a:pPr>
+            <a:r>
+              <a:rPr lang="nl-BE" dirty="0"/>
+              <a:t>      2</a:t>
+            </a:r>
+            <a:r>
+              <a:rPr lang="nl-BE" baseline="30000" dirty="0"/>
+              <a:t>de</a:t>
+            </a:r>
+            <a:r>
+              <a:rPr lang="nl-BE" dirty="0"/>
+              <a:t> scherm met label van de input</a:t>
+            </a:r>
+          </a:p>
+          <a:p>
+            <a:pPr marL="0" indent="0">
+              <a:buNone/>
+            </a:pPr>
+            <a:r>
+              <a:rPr lang="nl-BE" dirty="0"/>
+              <a:t>      + ga terug knop</a:t>
             </a:r>
           </a:p>
           <a:p>
@@ -8535,12 +8582,20 @@
             <p:ph type="title"/>
           </p:nvPr>
         </p:nvSpPr>
-        <p:spPr/>
+        <p:spPr>
+          <a:xfrm>
+            <a:off x="1484309" y="-228600"/>
+            <a:ext cx="10018713" cy="1752599"/>
+          </a:xfrm>
+        </p:spPr>
         <p:txBody>
           <a:bodyPr/>
           <a:lstStyle/>
           <a:p>
-            <a:endParaRPr lang="nl-BE"/>
+            <a:r>
+              <a:rPr lang="nl-BE" dirty="0"/>
+              <a:t>My second app</a:t>
+            </a:r>
           </a:p>
         </p:txBody>
       </p:sp>
@@ -8560,12 +8615,52 @@
             <p:ph idx="1"/>
           </p:nvPr>
         </p:nvSpPr>
-        <p:spPr/>
+        <p:spPr>
+          <a:xfrm>
+            <a:off x="1484308" y="2125823"/>
+            <a:ext cx="10018713" cy="3124201"/>
+          </a:xfrm>
+        </p:spPr>
         <p:txBody>
           <a:bodyPr/>
           <a:lstStyle/>
           <a:p>
-            <a:endParaRPr lang="nl-BE"/>
+            <a:r>
+              <a:rPr lang="nl-BE" dirty="0"/>
+              <a:t>We maken terug een nieuw applicatie</a:t>
+            </a:r>
+          </a:p>
+          <a:p>
+            <a:r>
+              <a:rPr lang="nl-BE" dirty="0"/>
+              <a:t>Aanpassen van de index.html</a:t>
+            </a:r>
+          </a:p>
+          <a:p>
+            <a:r>
+              <a:rPr lang="nl-BE" dirty="0"/>
+              <a:t>Nieuwe view aanmaken: project-&gt; </a:t>
+            </a:r>
+            <a:r>
+              <a:rPr lang="nl-BE" dirty="0" err="1"/>
+              <a:t>others</a:t>
+            </a:r>
+            <a:r>
+              <a:rPr lang="nl-BE" dirty="0"/>
+              <a:t> -&gt; views</a:t>
+            </a:r>
+          </a:p>
+          <a:p>
+            <a:r>
+              <a:rPr lang="nl-BE" dirty="0"/>
+              <a:t>Views + controller aanpassen</a:t>
+            </a:r>
+          </a:p>
+          <a:p>
+            <a:r>
+              <a:rPr lang="nl-BE" dirty="0"/>
+              <a:t>-&gt; zie live voorbeeld</a:t>
+            </a:r>
           </a:p>
         </p:txBody>
       </p:sp>
@@ -8573,6 +8668,655 @@
     <p:extLst>
       <p:ext uri="{BB962C8B-B14F-4D97-AF65-F5344CB8AC3E}">
         <p14:creationId xmlns:p14="http://schemas.microsoft.com/office/powerpoint/2010/main" val="20827604"/>
+      </p:ext>
+    </p:extLst>
+  </p:cSld>
+  <p:clrMapOvr>
+    <a:masterClrMapping/>
+  </p:clrMapOvr>
+</p:sld>
+</file>
+
+<file path=ppt/slides/slide25.xml><?xml version="1.0" encoding="utf-8"?>
+<p:sld xmlns:a="http://schemas.openxmlformats.org/drawingml/2006/main" xmlns:r="http://schemas.openxmlformats.org/officeDocument/2006/relationships" xmlns:p="http://schemas.openxmlformats.org/presentationml/2006/main">
+  <p:cSld>
+    <p:spTree>
+      <p:nvGrpSpPr>
+        <p:cNvPr id="1" name=""/>
+        <p:cNvGrpSpPr/>
+        <p:nvPr/>
+      </p:nvGrpSpPr>
+      <p:grpSpPr>
+        <a:xfrm>
+          <a:off x="0" y="0"/>
+          <a:ext cx="0" cy="0"/>
+          <a:chOff x="0" y="0"/>
+          <a:chExt cx="0" cy="0"/>
+        </a:xfrm>
+      </p:grpSpPr>
+      <p:sp>
+        <p:nvSpPr>
+          <p:cNvPr id="2" name="Titel 1">
+            <a:extLst>
+              <a:ext uri="{FF2B5EF4-FFF2-40B4-BE49-F238E27FC236}">
+                <a16:creationId xmlns:a16="http://schemas.microsoft.com/office/drawing/2014/main" id="{132C73AC-AB9F-42D9-9D6B-DC4833B6B9EB}"/>
+              </a:ext>
+            </a:extLst>
+          </p:cNvPr>
+          <p:cNvSpPr>
+            <a:spLocks noGrp="1"/>
+          </p:cNvSpPr>
+          <p:nvPr>
+            <p:ph type="title"/>
+          </p:nvPr>
+        </p:nvSpPr>
+        <p:spPr/>
+        <p:txBody>
+          <a:bodyPr/>
+          <a:lstStyle/>
+          <a:p>
+            <a:r>
+              <a:rPr lang="nl-BE" dirty="0"/>
+              <a:t>Events + Toast</a:t>
+            </a:r>
+          </a:p>
+        </p:txBody>
+      </p:sp>
+      <p:sp>
+        <p:nvSpPr>
+          <p:cNvPr id="3" name="Tijdelijke aanduiding voor inhoud 2">
+            <a:extLst>
+              <a:ext uri="{FF2B5EF4-FFF2-40B4-BE49-F238E27FC236}">
+                <a16:creationId xmlns:a16="http://schemas.microsoft.com/office/drawing/2014/main" id="{446C4A93-C1BC-4D95-B2A3-FA2453D8F1D9}"/>
+              </a:ext>
+            </a:extLst>
+          </p:cNvPr>
+          <p:cNvSpPr>
+            <a:spLocks noGrp="1"/>
+          </p:cNvSpPr>
+          <p:nvPr>
+            <p:ph idx="1"/>
+          </p:nvPr>
+        </p:nvSpPr>
+        <p:spPr/>
+        <p:txBody>
+          <a:bodyPr/>
+          <a:lstStyle/>
+          <a:p>
+            <a:r>
+              <a:rPr lang="nl-BE" dirty="0"/>
+              <a:t>Click, focus, </a:t>
+            </a:r>
+            <a:r>
+              <a:rPr lang="nl-BE" dirty="0" err="1"/>
+              <a:t>keypress</a:t>
+            </a:r>
+            <a:r>
+              <a:rPr lang="nl-BE" dirty="0"/>
+              <a:t>, </a:t>
+            </a:r>
+            <a:r>
+              <a:rPr lang="nl-BE" dirty="0" err="1"/>
+              <a:t>submit</a:t>
+            </a:r>
+            <a:r>
+              <a:rPr lang="nl-BE" dirty="0"/>
+              <a:t>, …</a:t>
+            </a:r>
+          </a:p>
+          <a:p>
+            <a:pPr>
+              <a:buFont typeface="Symbol" panose="05050102010706020507" pitchFamily="18" charset="2"/>
+              <a:buChar char="Þ"/>
+            </a:pPr>
+            <a:r>
+              <a:rPr lang="nl-BE" dirty="0" err="1"/>
+              <a:t>liveChange</a:t>
+            </a:r>
+            <a:r>
+              <a:rPr lang="nl-BE" dirty="0"/>
+              <a:t> event :</a:t>
+            </a:r>
+            <a:r>
+              <a:rPr lang="nl-BE" dirty="0" err="1">
+                <a:hlinkClick r:id="rId2"/>
+              </a:rPr>
+              <a:t>https</a:t>
+            </a:r>
+            <a:r>
+              <a:rPr lang="nl-BE" dirty="0">
+                <a:hlinkClick r:id="rId2"/>
+              </a:rPr>
+              <a:t>://openui5.hana.ondemand.com/#/api/</a:t>
+            </a:r>
+            <a:r>
+              <a:rPr lang="nl-BE" dirty="0" err="1">
+                <a:hlinkClick r:id="rId2"/>
+              </a:rPr>
+              <a:t>sap.m.Input</a:t>
+            </a:r>
+            <a:endParaRPr lang="nl-BE" dirty="0"/>
+          </a:p>
+          <a:p>
+            <a:pPr marL="0" indent="0">
+              <a:buNone/>
+            </a:pPr>
+            <a:r>
+              <a:rPr lang="nl-BE" dirty="0"/>
+              <a:t>Zie code </a:t>
+            </a:r>
+            <a:r>
+              <a:rPr lang="nl-BE" dirty="0" err="1"/>
+              <a:t>example</a:t>
+            </a:r>
+            <a:r>
+              <a:rPr lang="nl-BE" dirty="0"/>
+              <a:t> eventhandling</a:t>
+            </a:r>
+          </a:p>
+          <a:p>
+            <a:pPr marL="0" indent="0">
+              <a:buNone/>
+            </a:pPr>
+            <a:endParaRPr lang="nl-BE" dirty="0"/>
+          </a:p>
+          <a:p>
+            <a:pPr marL="0" indent="0">
+              <a:buNone/>
+            </a:pPr>
+            <a:endParaRPr lang="nl-BE" dirty="0"/>
+          </a:p>
+          <a:p>
+            <a:endParaRPr lang="nl-BE" dirty="0"/>
+          </a:p>
+          <a:p>
+            <a:endParaRPr lang="nl-BE" dirty="0"/>
+          </a:p>
+        </p:txBody>
+      </p:sp>
+    </p:spTree>
+    <p:extLst>
+      <p:ext uri="{BB962C8B-B14F-4D97-AF65-F5344CB8AC3E}">
+        <p14:creationId xmlns:p14="http://schemas.microsoft.com/office/powerpoint/2010/main" val="3732170951"/>
+      </p:ext>
+    </p:extLst>
+  </p:cSld>
+  <p:clrMapOvr>
+    <a:masterClrMapping/>
+  </p:clrMapOvr>
+</p:sld>
+</file>
+
+<file path=ppt/slides/slide26.xml><?xml version="1.0" encoding="utf-8"?>
+<p:sld xmlns:a="http://schemas.openxmlformats.org/drawingml/2006/main" xmlns:r="http://schemas.openxmlformats.org/officeDocument/2006/relationships" xmlns:p="http://schemas.openxmlformats.org/presentationml/2006/main">
+  <p:cSld>
+    <p:spTree>
+      <p:nvGrpSpPr>
+        <p:cNvPr id="1" name=""/>
+        <p:cNvGrpSpPr/>
+        <p:nvPr/>
+      </p:nvGrpSpPr>
+      <p:grpSpPr>
+        <a:xfrm>
+          <a:off x="0" y="0"/>
+          <a:ext cx="0" cy="0"/>
+          <a:chOff x="0" y="0"/>
+          <a:chExt cx="0" cy="0"/>
+        </a:xfrm>
+      </p:grpSpPr>
+      <p:sp>
+        <p:nvSpPr>
+          <p:cNvPr id="2" name="Titel 1">
+            <a:extLst>
+              <a:ext uri="{FF2B5EF4-FFF2-40B4-BE49-F238E27FC236}">
+                <a16:creationId xmlns:a16="http://schemas.microsoft.com/office/drawing/2014/main" id="{132C73AC-AB9F-42D9-9D6B-DC4833B6B9EB}"/>
+              </a:ext>
+            </a:extLst>
+          </p:cNvPr>
+          <p:cNvSpPr>
+            <a:spLocks noGrp="1"/>
+          </p:cNvSpPr>
+          <p:nvPr>
+            <p:ph type="title"/>
+          </p:nvPr>
+        </p:nvSpPr>
+        <p:spPr>
+          <a:xfrm>
+            <a:off x="2030411" y="-1"/>
+            <a:ext cx="10018713" cy="2012673"/>
+          </a:xfrm>
+        </p:spPr>
+        <p:txBody>
+          <a:bodyPr/>
+          <a:lstStyle/>
+          <a:p>
+            <a:r>
+              <a:rPr lang="nl-BE" dirty="0"/>
+              <a:t>REST +</a:t>
+            </a:r>
+            <a:r>
+              <a:rPr lang="nl-BE" dirty="0" err="1"/>
+              <a:t>OData</a:t>
+            </a:r>
+            <a:endParaRPr lang="nl-BE" dirty="0"/>
+          </a:p>
+        </p:txBody>
+      </p:sp>
+      <p:sp>
+        <p:nvSpPr>
+          <p:cNvPr id="3" name="Tijdelijke aanduiding voor inhoud 2">
+            <a:extLst>
+              <a:ext uri="{FF2B5EF4-FFF2-40B4-BE49-F238E27FC236}">
+                <a16:creationId xmlns:a16="http://schemas.microsoft.com/office/drawing/2014/main" id="{446C4A93-C1BC-4D95-B2A3-FA2453D8F1D9}"/>
+              </a:ext>
+            </a:extLst>
+          </p:cNvPr>
+          <p:cNvSpPr>
+            <a:spLocks noGrp="1"/>
+          </p:cNvSpPr>
+          <p:nvPr>
+            <p:ph idx="1"/>
+          </p:nvPr>
+        </p:nvSpPr>
+        <p:spPr>
+          <a:xfrm>
+            <a:off x="1500324" y="2012673"/>
+            <a:ext cx="9631502" cy="3124201"/>
+          </a:xfrm>
+        </p:spPr>
+        <p:txBody>
+          <a:bodyPr/>
+          <a:lstStyle/>
+          <a:p>
+            <a:r>
+              <a:rPr lang="nl-BE" dirty="0"/>
+              <a:t>Voor meer info zie: </a:t>
+            </a:r>
+            <a:r>
+              <a:rPr lang="nl-BE" dirty="0">
+                <a:hlinkClick r:id="rId2"/>
+              </a:rPr>
+              <a:t>www.odata.org/odata-services/</a:t>
+            </a:r>
+            <a:endParaRPr lang="nl-BE" dirty="0"/>
+          </a:p>
+          <a:p>
+            <a:r>
+              <a:rPr lang="nl-BE" dirty="0"/>
+              <a:t>Voorbeeld data =  </a:t>
+            </a:r>
+            <a:r>
+              <a:rPr lang="nl-BE" dirty="0">
+                <a:hlinkClick r:id="rId3"/>
+              </a:rPr>
+              <a:t>http://services.odata.org/TripPinRESTierService/(S(ltoplzrk3qucxh2iuz2znzum))/People</a:t>
+            </a:r>
+            <a:r>
+              <a:rPr lang="nl-BE" dirty="0"/>
+              <a:t> </a:t>
+            </a:r>
+          </a:p>
+          <a:p>
+            <a:r>
+              <a:rPr lang="nl-BE" dirty="0">
+                <a:hlinkClick r:id="rId4"/>
+              </a:rPr>
+              <a:t>https://codebeautify.org/jsonviewer</a:t>
+            </a:r>
+            <a:endParaRPr lang="nl-BE" dirty="0"/>
+          </a:p>
+          <a:p>
+            <a:endParaRPr lang="nl-BE" dirty="0"/>
+          </a:p>
+          <a:p>
+            <a:endParaRPr lang="nl-BE" dirty="0"/>
+          </a:p>
+        </p:txBody>
+      </p:sp>
+    </p:spTree>
+    <p:extLst>
+      <p:ext uri="{BB962C8B-B14F-4D97-AF65-F5344CB8AC3E}">
+        <p14:creationId xmlns:p14="http://schemas.microsoft.com/office/powerpoint/2010/main" val="395857557"/>
+      </p:ext>
+    </p:extLst>
+  </p:cSld>
+  <p:clrMapOvr>
+    <a:masterClrMapping/>
+  </p:clrMapOvr>
+</p:sld>
+</file>
+
+<file path=ppt/slides/slide27.xml><?xml version="1.0" encoding="utf-8"?>
+<p:sld xmlns:a="http://schemas.openxmlformats.org/drawingml/2006/main" xmlns:r="http://schemas.openxmlformats.org/officeDocument/2006/relationships" xmlns:p="http://schemas.openxmlformats.org/presentationml/2006/main">
+  <p:cSld>
+    <p:spTree>
+      <p:nvGrpSpPr>
+        <p:cNvPr id="1" name=""/>
+        <p:cNvGrpSpPr/>
+        <p:nvPr/>
+      </p:nvGrpSpPr>
+      <p:grpSpPr>
+        <a:xfrm>
+          <a:off x="0" y="0"/>
+          <a:ext cx="0" cy="0"/>
+          <a:chOff x="0" y="0"/>
+          <a:chExt cx="0" cy="0"/>
+        </a:xfrm>
+      </p:grpSpPr>
+      <p:sp>
+        <p:nvSpPr>
+          <p:cNvPr id="2" name="Titel 1">
+            <a:extLst>
+              <a:ext uri="{FF2B5EF4-FFF2-40B4-BE49-F238E27FC236}">
+                <a16:creationId xmlns:a16="http://schemas.microsoft.com/office/drawing/2014/main" id="{132C73AC-AB9F-42D9-9D6B-DC4833B6B9EB}"/>
+              </a:ext>
+            </a:extLst>
+          </p:cNvPr>
+          <p:cNvSpPr>
+            <a:spLocks noGrp="1"/>
+          </p:cNvSpPr>
+          <p:nvPr>
+            <p:ph type="title"/>
+          </p:nvPr>
+        </p:nvSpPr>
+        <p:spPr>
+          <a:xfrm>
+            <a:off x="1669841" y="0"/>
+            <a:ext cx="10018713" cy="1752599"/>
+          </a:xfrm>
+        </p:spPr>
+        <p:txBody>
+          <a:bodyPr/>
+          <a:lstStyle/>
+          <a:p>
+            <a:r>
+              <a:rPr lang="nl-BE" dirty="0"/>
+              <a:t>Free online tool </a:t>
+            </a:r>
+            <a:r>
+              <a:rPr lang="nl-BE" dirty="0" err="1"/>
+              <a:t>for</a:t>
+            </a:r>
+            <a:r>
+              <a:rPr lang="nl-BE" dirty="0"/>
+              <a:t> </a:t>
+            </a:r>
+            <a:r>
+              <a:rPr lang="nl-BE" dirty="0" err="1"/>
+              <a:t>json</a:t>
+            </a:r>
+            <a:r>
+              <a:rPr lang="nl-BE" dirty="0"/>
+              <a:t> </a:t>
+            </a:r>
+          </a:p>
+        </p:txBody>
+      </p:sp>
+      <p:pic>
+        <p:nvPicPr>
+          <p:cNvPr id="4" name="Tijdelijke aanduiding voor inhoud 3">
+            <a:extLst>
+              <a:ext uri="{FF2B5EF4-FFF2-40B4-BE49-F238E27FC236}">
+                <a16:creationId xmlns:a16="http://schemas.microsoft.com/office/drawing/2014/main" id="{19D3E18D-EA26-417B-A06A-1897BB4C2C40}"/>
+              </a:ext>
+            </a:extLst>
+          </p:cNvPr>
+          <p:cNvPicPr>
+            <a:picLocks noGrp="1" noChangeAspect="1"/>
+          </p:cNvPicPr>
+          <p:nvPr>
+            <p:ph idx="1"/>
+          </p:nvPr>
+        </p:nvPicPr>
+        <p:blipFill>
+          <a:blip r:embed="rId2">
+            <a:extLst>
+              <a:ext uri="{28A0092B-C50C-407E-A947-70E740481C1C}">
+                <a14:useLocalDpi xmlns:a14="http://schemas.microsoft.com/office/drawing/2010/main" val="0"/>
+              </a:ext>
+            </a:extLst>
+          </a:blip>
+          <a:stretch>
+            <a:fillRect/>
+          </a:stretch>
+        </p:blipFill>
+        <p:spPr>
+          <a:xfrm>
+            <a:off x="2380604" y="1657579"/>
+            <a:ext cx="8790911" cy="4898934"/>
+          </a:xfrm>
+          <a:prstGeom prst="rect">
+            <a:avLst/>
+          </a:prstGeom>
+        </p:spPr>
+      </p:pic>
+    </p:spTree>
+    <p:extLst>
+      <p:ext uri="{BB962C8B-B14F-4D97-AF65-F5344CB8AC3E}">
+        <p14:creationId xmlns:p14="http://schemas.microsoft.com/office/powerpoint/2010/main" val="2967076552"/>
+      </p:ext>
+    </p:extLst>
+  </p:cSld>
+  <p:clrMapOvr>
+    <a:masterClrMapping/>
+  </p:clrMapOvr>
+</p:sld>
+</file>
+
+<file path=ppt/slides/slide28.xml><?xml version="1.0" encoding="utf-8"?>
+<p:sld xmlns:a="http://schemas.openxmlformats.org/drawingml/2006/main" xmlns:r="http://schemas.openxmlformats.org/officeDocument/2006/relationships" xmlns:p="http://schemas.openxmlformats.org/presentationml/2006/main">
+  <p:cSld>
+    <p:spTree>
+      <p:nvGrpSpPr>
+        <p:cNvPr id="1" name=""/>
+        <p:cNvGrpSpPr/>
+        <p:nvPr/>
+      </p:nvGrpSpPr>
+      <p:grpSpPr>
+        <a:xfrm>
+          <a:off x="0" y="0"/>
+          <a:ext cx="0" cy="0"/>
+          <a:chOff x="0" y="0"/>
+          <a:chExt cx="0" cy="0"/>
+        </a:xfrm>
+      </p:grpSpPr>
+      <p:sp>
+        <p:nvSpPr>
+          <p:cNvPr id="2" name="Titel 1">
+            <a:extLst>
+              <a:ext uri="{FF2B5EF4-FFF2-40B4-BE49-F238E27FC236}">
+                <a16:creationId xmlns:a16="http://schemas.microsoft.com/office/drawing/2014/main" id="{132C73AC-AB9F-42D9-9D6B-DC4833B6B9EB}"/>
+              </a:ext>
+            </a:extLst>
+          </p:cNvPr>
+          <p:cNvSpPr>
+            <a:spLocks noGrp="1"/>
+          </p:cNvSpPr>
+          <p:nvPr>
+            <p:ph type="title"/>
+          </p:nvPr>
+        </p:nvSpPr>
+        <p:spPr>
+          <a:xfrm>
+            <a:off x="1484309" y="190500"/>
+            <a:ext cx="10018713" cy="1752599"/>
+          </a:xfrm>
+        </p:spPr>
+        <p:txBody>
+          <a:bodyPr/>
+          <a:lstStyle/>
+          <a:p>
+            <a:r>
+              <a:rPr lang="nl-BE" dirty="0"/>
+              <a:t>GET </a:t>
+            </a:r>
+            <a:r>
+              <a:rPr lang="nl-BE" dirty="0" err="1"/>
+              <a:t>example</a:t>
+            </a:r>
+            <a:endParaRPr lang="nl-BE" dirty="0"/>
+          </a:p>
+        </p:txBody>
+      </p:sp>
+      <p:sp>
+        <p:nvSpPr>
+          <p:cNvPr id="3" name="Tijdelijke aanduiding voor inhoud 2">
+            <a:extLst>
+              <a:ext uri="{FF2B5EF4-FFF2-40B4-BE49-F238E27FC236}">
+                <a16:creationId xmlns:a16="http://schemas.microsoft.com/office/drawing/2014/main" id="{446C4A93-C1BC-4D95-B2A3-FA2453D8F1D9}"/>
+              </a:ext>
+            </a:extLst>
+          </p:cNvPr>
+          <p:cNvSpPr>
+            <a:spLocks noGrp="1"/>
+          </p:cNvSpPr>
+          <p:nvPr>
+            <p:ph idx="1"/>
+          </p:nvPr>
+        </p:nvSpPr>
+        <p:spPr>
+          <a:xfrm>
+            <a:off x="1568200" y="1866899"/>
+            <a:ext cx="10018713" cy="3124201"/>
+          </a:xfrm>
+        </p:spPr>
+        <p:txBody>
+          <a:bodyPr/>
+          <a:lstStyle/>
+          <a:p>
+            <a:r>
+              <a:rPr lang="nl-BE" dirty="0"/>
+              <a:t>Data weergeven in List met list items</a:t>
+            </a:r>
+          </a:p>
+          <a:p>
+            <a:r>
+              <a:rPr lang="nl-BE" dirty="0"/>
+              <a:t>Ajax call </a:t>
+            </a:r>
+            <a:r>
+              <a:rPr lang="nl-BE" dirty="0" err="1"/>
+              <a:t>to</a:t>
+            </a:r>
+            <a:r>
+              <a:rPr lang="nl-BE" dirty="0"/>
+              <a:t> GET</a:t>
+            </a:r>
+          </a:p>
+          <a:p>
+            <a:r>
+              <a:rPr lang="nl-BE" dirty="0"/>
+              <a:t>Data binding</a:t>
+            </a:r>
+          </a:p>
+          <a:p>
+            <a:r>
+              <a:rPr lang="nl-BE" dirty="0"/>
+              <a:t>Zie code </a:t>
+            </a:r>
+            <a:r>
+              <a:rPr lang="nl-BE" dirty="0" err="1"/>
+              <a:t>example</a:t>
+            </a:r>
+            <a:r>
+              <a:rPr lang="nl-BE" dirty="0"/>
+              <a:t> rest</a:t>
+            </a:r>
+          </a:p>
+        </p:txBody>
+      </p:sp>
+    </p:spTree>
+    <p:extLst>
+      <p:ext uri="{BB962C8B-B14F-4D97-AF65-F5344CB8AC3E}">
+        <p14:creationId xmlns:p14="http://schemas.microsoft.com/office/powerpoint/2010/main" val="2045190148"/>
+      </p:ext>
+    </p:extLst>
+  </p:cSld>
+  <p:clrMapOvr>
+    <a:masterClrMapping/>
+  </p:clrMapOvr>
+</p:sld>
+</file>
+
+<file path=ppt/slides/slide29.xml><?xml version="1.0" encoding="utf-8"?>
+<p:sld xmlns:a="http://schemas.openxmlformats.org/drawingml/2006/main" xmlns:r="http://schemas.openxmlformats.org/officeDocument/2006/relationships" xmlns:p="http://schemas.openxmlformats.org/presentationml/2006/main">
+  <p:cSld>
+    <p:spTree>
+      <p:nvGrpSpPr>
+        <p:cNvPr id="1" name=""/>
+        <p:cNvGrpSpPr/>
+        <p:nvPr/>
+      </p:nvGrpSpPr>
+      <p:grpSpPr>
+        <a:xfrm>
+          <a:off x="0" y="0"/>
+          <a:ext cx="0" cy="0"/>
+          <a:chOff x="0" y="0"/>
+          <a:chExt cx="0" cy="0"/>
+        </a:xfrm>
+      </p:grpSpPr>
+      <p:sp>
+        <p:nvSpPr>
+          <p:cNvPr id="2" name="Titel 1">
+            <a:extLst>
+              <a:ext uri="{FF2B5EF4-FFF2-40B4-BE49-F238E27FC236}">
+                <a16:creationId xmlns:a16="http://schemas.microsoft.com/office/drawing/2014/main" id="{132C73AC-AB9F-42D9-9D6B-DC4833B6B9EB}"/>
+              </a:ext>
+            </a:extLst>
+          </p:cNvPr>
+          <p:cNvSpPr>
+            <a:spLocks noGrp="1"/>
+          </p:cNvSpPr>
+          <p:nvPr>
+            <p:ph type="title"/>
+          </p:nvPr>
+        </p:nvSpPr>
+        <p:spPr>
+          <a:xfrm>
+            <a:off x="1484310" y="1790699"/>
+            <a:ext cx="10018713" cy="1752599"/>
+          </a:xfrm>
+        </p:spPr>
+        <p:txBody>
+          <a:bodyPr/>
+          <a:lstStyle/>
+          <a:p>
+            <a:r>
+              <a:rPr lang="nl-BE" dirty="0"/>
+              <a:t>Bedankt voor uw aandacht!</a:t>
+            </a:r>
+          </a:p>
+        </p:txBody>
+      </p:sp>
+      <p:sp>
+        <p:nvSpPr>
+          <p:cNvPr id="3" name="Tijdelijke aanduiding voor inhoud 2">
+            <a:extLst>
+              <a:ext uri="{FF2B5EF4-FFF2-40B4-BE49-F238E27FC236}">
+                <a16:creationId xmlns:a16="http://schemas.microsoft.com/office/drawing/2014/main" id="{446C4A93-C1BC-4D95-B2A3-FA2453D8F1D9}"/>
+              </a:ext>
+            </a:extLst>
+          </p:cNvPr>
+          <p:cNvSpPr>
+            <a:spLocks noGrp="1"/>
+          </p:cNvSpPr>
+          <p:nvPr>
+            <p:ph idx="1"/>
+          </p:nvPr>
+        </p:nvSpPr>
+        <p:spPr/>
+        <p:txBody>
+          <a:bodyPr/>
+          <a:lstStyle/>
+          <a:p>
+            <a:endParaRPr lang="nl-BE"/>
+          </a:p>
+        </p:txBody>
+      </p:sp>
+    </p:spTree>
+    <p:extLst>
+      <p:ext uri="{BB962C8B-B14F-4D97-AF65-F5344CB8AC3E}">
+        <p14:creationId xmlns:p14="http://schemas.microsoft.com/office/powerpoint/2010/main" val="1531795888"/>
       </p:ext>
     </p:extLst>
   </p:cSld>
@@ -8958,7 +9702,12 @@
             <p:ph idx="1"/>
           </p:nvPr>
         </p:nvSpPr>
-        <p:spPr/>
+        <p:spPr>
+          <a:xfrm>
+            <a:off x="1687510" y="1473199"/>
+            <a:ext cx="10018713" cy="3124201"/>
+          </a:xfrm>
+        </p:spPr>
         <p:txBody>
           <a:bodyPr/>
           <a:lstStyle/>
@@ -8973,7 +9722,27 @@
             </a:r>
             <a:r>
               <a:rPr lang="nl-BE" dirty="0"/>
-              <a:t>  gemaakt voor SAP                                                                           voor HTML5  web applicaties</a:t>
+              <a:t>  gemaakt voor SAP voor HTML5  web applicaties</a:t>
+            </a:r>
+          </a:p>
+          <a:p>
+            <a:r>
+              <a:rPr lang="nl-BE" dirty="0"/>
+              <a:t>Toolkit van elementen</a:t>
+            </a:r>
+          </a:p>
+          <a:p>
+            <a:r>
+              <a:rPr lang="nl-BE" dirty="0"/>
+              <a:t>Gebaseerd op Javascript, </a:t>
+            </a:r>
+            <a:r>
+              <a:rPr lang="nl-BE" dirty="0" err="1"/>
+              <a:t>Css</a:t>
+            </a:r>
+            <a:r>
+              <a:rPr lang="nl-BE" dirty="0"/>
+              <a:t> en Html5</a:t>
             </a:r>
           </a:p>
         </p:txBody>
@@ -9151,7 +9920,7 @@
             </a:r>
             <a:r>
               <a:rPr lang="nl-BE" sz="3000" dirty="0"/>
-              <a:t> het afgewerkt product of applicatie </a:t>
+              <a:t> is het afgewerkt product of applicatie </a:t>
             </a:r>
           </a:p>
         </p:txBody>
@@ -9239,7 +10008,7 @@
         </p:nvSpPr>
         <p:spPr>
           <a:xfrm>
-            <a:off x="1652262" y="107303"/>
+            <a:off x="1670921" y="-69979"/>
             <a:ext cx="10018713" cy="1752599"/>
           </a:xfrm>
         </p:spPr>
@@ -9262,45 +10031,117 @@
           </a:p>
         </p:txBody>
       </p:sp>
-      <p:pic>
-        <p:nvPicPr>
-          <p:cNvPr id="5" name="Tijdelijke aanduiding voor inhoud 4">
+      <p:sp>
+        <p:nvSpPr>
+          <p:cNvPr id="3" name="Tijdelijke aanduiding voor inhoud 2">
             <a:extLst>
               <a:ext uri="{FF2B5EF4-FFF2-40B4-BE49-F238E27FC236}">
-                <a16:creationId xmlns:a16="http://schemas.microsoft.com/office/drawing/2014/main" id="{61AE6B38-B02E-4A62-B2B2-77F49F58C11B}"/>
+                <a16:creationId xmlns:a16="http://schemas.microsoft.com/office/drawing/2014/main" id="{2E96BF2C-E254-4245-BC3A-FC630ED7780D}"/>
               </a:ext>
             </a:extLst>
           </p:cNvPr>
-          <p:cNvPicPr>
-            <a:picLocks noGrp="1" noChangeAspect="1"/>
-          </p:cNvPicPr>
+          <p:cNvSpPr>
+            <a:spLocks noGrp="1"/>
+          </p:cNvSpPr>
           <p:nvPr>
             <p:ph idx="1"/>
           </p:nvPr>
-        </p:nvPicPr>
-        <p:blipFill>
-          <a:blip r:embed="rId2">
-            <a:extLst>
-              <a:ext uri="{28A0092B-C50C-407E-A947-70E740481C1C}">
-                <a14:useLocalDpi xmlns:a14="http://schemas.microsoft.com/office/drawing/2010/main" val="0"/>
-              </a:ext>
-            </a:extLst>
-          </a:blip>
-          <a:stretch>
-            <a:fillRect/>
-          </a:stretch>
-        </p:blipFill>
+        </p:nvSpPr>
         <p:spPr>
           <a:xfrm>
-            <a:off x="3453656" y="1651519"/>
-            <a:ext cx="7086082" cy="4988767"/>
+            <a:off x="1670921" y="1682620"/>
+            <a:ext cx="10018713" cy="4587551"/>
           </a:xfrm>
         </p:spPr>
-      </p:pic>
+        <p:txBody>
+          <a:bodyPr>
+            <a:normAutofit/>
+          </a:bodyPr>
+          <a:lstStyle/>
+          <a:p>
+            <a:pPr lvl="0"/>
+            <a:r>
+              <a:rPr lang="nl-BE" dirty="0"/>
+              <a:t>Simpel:   de applicatie moet gemaakt worden voor: 1 user , 1 </a:t>
+            </a:r>
+            <a:r>
+              <a:rPr lang="nl-BE" dirty="0" err="1"/>
+              <a:t>use</a:t>
+            </a:r>
+            <a:r>
+              <a:rPr lang="nl-BE" dirty="0"/>
+              <a:t> case en 3 navigatie schermen</a:t>
+            </a:r>
+          </a:p>
+          <a:p>
+            <a:pPr lvl="0"/>
+            <a:r>
+              <a:rPr lang="nl-BE" dirty="0" err="1"/>
+              <a:t>Role</a:t>
+            </a:r>
+            <a:r>
+              <a:rPr lang="nl-BE" dirty="0"/>
+              <a:t> </a:t>
+            </a:r>
+            <a:r>
+              <a:rPr lang="nl-BE" dirty="0" err="1"/>
+              <a:t>based</a:t>
+            </a:r>
+            <a:r>
+              <a:rPr lang="nl-BE" dirty="0"/>
+              <a:t>: dezelfde applicatie moet kunnen worden gebruikt door verschillende gebruikers op verschillende niveaus tegelijkertijd</a:t>
+            </a:r>
+          </a:p>
+          <a:p>
+            <a:pPr lvl="0"/>
+            <a:r>
+              <a:rPr lang="nl-BE" dirty="0"/>
+              <a:t>Instant </a:t>
+            </a:r>
+            <a:r>
+              <a:rPr lang="nl-BE" dirty="0" err="1"/>
+              <a:t>value</a:t>
+            </a:r>
+            <a:r>
+              <a:rPr lang="nl-BE" dirty="0"/>
+              <a:t>: als je nieuw product maakt moet  het  een kleine stap zijn voor je eindgebruikers om zich aan te passen</a:t>
+            </a:r>
+          </a:p>
+          <a:p>
+            <a:pPr lvl="0"/>
+            <a:r>
+              <a:rPr lang="nl-BE" dirty="0"/>
+              <a:t>Coherent: de applicatie moet de zelfde look </a:t>
+            </a:r>
+            <a:r>
+              <a:rPr lang="nl-BE" dirty="0" err="1"/>
+              <a:t>and</a:t>
+            </a:r>
+            <a:r>
+              <a:rPr lang="nl-BE" dirty="0"/>
+              <a:t> feel hebben</a:t>
+            </a:r>
+          </a:p>
+          <a:p>
+            <a:pPr lvl="0"/>
+            <a:r>
+              <a:rPr lang="nl-BE" dirty="0" err="1"/>
+              <a:t>Responsive</a:t>
+            </a:r>
+            <a:r>
+              <a:rPr lang="nl-BE" dirty="0"/>
+              <a:t>:  beschikbaar op smartphone, tablet en desktop</a:t>
+            </a:r>
+          </a:p>
+          <a:p>
+            <a:endParaRPr lang="nl-BE" dirty="0"/>
+          </a:p>
+        </p:txBody>
+      </p:sp>
     </p:spTree>
     <p:extLst>
       <p:ext uri="{BB962C8B-B14F-4D97-AF65-F5344CB8AC3E}">
-        <p14:creationId xmlns:p14="http://schemas.microsoft.com/office/powerpoint/2010/main" val="981682686"/>
+        <p14:creationId xmlns:p14="http://schemas.microsoft.com/office/powerpoint/2010/main" val="786528800"/>
       </p:ext>
     </p:extLst>
   </p:cSld>

</xml_diff>